<commit_message>
Add README file, comments in index.html and updated PPTX.
</commit_message>
<xml_diff>
--- a/Introducing React.pptx
+++ b/Introducing React.pptx
@@ -15,7 +15,7 @@
     <p:sldId id="261" r:id="rId6"/>
     <p:sldId id="262" r:id="rId7"/>
     <p:sldId id="263" r:id="rId8"/>
-    <p:sldId id="265" r:id="rId9"/>
+    <p:sldId id="266" r:id="rId9"/>
   </p:sldIdLst>
   <p:sldSz cx="12192000" cy="6858000"/>
   <p:notesSz cx="6858000" cy="9144000"/>
@@ -204,7 +204,7 @@
           <a:p>
             <a:fld id="{CD077CA3-4C4F-4B99-8208-EB4BAD059187}" type="datetimeFigureOut">
               <a:rPr lang="en-US" smtClean="0"/>
-              <a:t>08/11/2016</a:t>
+              <a:t>09/11/2016</a:t>
             </a:fld>
             <a:endParaRPr lang="en-US"/>
           </a:p>
@@ -853,111 +853,6 @@
 </p:notes>
 </file>
 
-<file path=ppt/notesSlides/notesSlide5.xml><?xml version="1.0" encoding="utf-8"?>
-<p:notes xmlns:a="http://schemas.openxmlformats.org/drawingml/2006/main" xmlns:r="http://schemas.openxmlformats.org/officeDocument/2006/relationships" xmlns:p="http://schemas.openxmlformats.org/presentationml/2006/main">
-  <p:cSld>
-    <p:spTree>
-      <p:nvGrpSpPr>
-        <p:cNvPr id="1" name=""/>
-        <p:cNvGrpSpPr/>
-        <p:nvPr/>
-      </p:nvGrpSpPr>
-      <p:grpSpPr>
-        <a:xfrm>
-          <a:off x="0" y="0"/>
-          <a:ext cx="0" cy="0"/>
-          <a:chOff x="0" y="0"/>
-          <a:chExt cx="0" cy="0"/>
-        </a:xfrm>
-      </p:grpSpPr>
-      <p:sp>
-        <p:nvSpPr>
-          <p:cNvPr id="2" name="Slide Image Placeholder 1"/>
-          <p:cNvSpPr>
-            <a:spLocks noGrp="1" noRot="1" noChangeAspect="1"/>
-          </p:cNvSpPr>
-          <p:nvPr>
-            <p:ph type="sldImg"/>
-          </p:nvPr>
-        </p:nvSpPr>
-        <p:spPr/>
-      </p:sp>
-      <p:sp>
-        <p:nvSpPr>
-          <p:cNvPr id="3" name="Notes Placeholder 2"/>
-          <p:cNvSpPr>
-            <a:spLocks noGrp="1"/>
-          </p:cNvSpPr>
-          <p:nvPr>
-            <p:ph type="body" idx="1"/>
-          </p:nvPr>
-        </p:nvSpPr>
-        <p:spPr/>
-        <p:txBody>
-          <a:bodyPr/>
-          <a:lstStyle/>
-          <a:p>
-            <a:r>
-              <a:rPr lang="en-US" dirty="0" smtClean="0"/>
-              <a:t> - History</a:t>
-            </a:r>
-            <a:r>
-              <a:rPr lang="en-US" baseline="0" dirty="0" smtClean="0"/>
-              <a:t> on why Facebook needed it</a:t>
-            </a:r>
-            <a:br>
-              <a:rPr lang="en-US" baseline="0" dirty="0" smtClean="0"/>
-            </a:br>
-            <a:r>
-              <a:rPr lang="en-US" baseline="0" dirty="0" smtClean="0"/>
-              <a:t> - V so not comparable with Angular. If we want to compare, we would need to add Flux or Redux to manage flow</a:t>
-            </a:r>
-          </a:p>
-          <a:p>
-            <a:r>
-              <a:rPr lang="en-US" baseline="0" dirty="0" smtClean="0"/>
-              <a:t> - Can also be used partially, e.g. backbone js or any MVC framework</a:t>
-            </a:r>
-            <a:endParaRPr lang="en-US" dirty="0"/>
-          </a:p>
-        </p:txBody>
-      </p:sp>
-      <p:sp>
-        <p:nvSpPr>
-          <p:cNvPr id="4" name="Slide Number Placeholder 3"/>
-          <p:cNvSpPr>
-            <a:spLocks noGrp="1"/>
-          </p:cNvSpPr>
-          <p:nvPr>
-            <p:ph type="sldNum" sz="quarter" idx="10"/>
-          </p:nvPr>
-        </p:nvSpPr>
-        <p:spPr/>
-        <p:txBody>
-          <a:bodyPr/>
-          <a:lstStyle/>
-          <a:p>
-            <a:fld id="{42A1D193-5380-45BA-9638-D09E95D6AFDB}" type="slidenum">
-              <a:rPr lang="en-US" smtClean="0"/>
-              <a:t>8</a:t>
-            </a:fld>
-            <a:endParaRPr lang="en-US"/>
-          </a:p>
-        </p:txBody>
-      </p:sp>
-    </p:spTree>
-    <p:extLst>
-      <p:ext uri="{BB962C8B-B14F-4D97-AF65-F5344CB8AC3E}">
-        <p14:creationId xmlns:p14="http://schemas.microsoft.com/office/powerpoint/2010/main" val="2317165383"/>
-      </p:ext>
-    </p:extLst>
-  </p:cSld>
-  <p:clrMapOvr>
-    <a:masterClrMapping/>
-  </p:clrMapOvr>
-</p:notes>
-</file>
-
 <file path=ppt/slideLayouts/slideLayout1.xml><?xml version="1.0" encoding="utf-8"?>
 <p:sldLayout xmlns:a="http://schemas.openxmlformats.org/drawingml/2006/main" xmlns:r="http://schemas.openxmlformats.org/officeDocument/2006/relationships" xmlns:p="http://schemas.openxmlformats.org/presentationml/2006/main" type="title" preserve="1">
   <p:cSld name="Title Slide">
@@ -1171,7 +1066,7 @@
           <a:p>
             <a:fld id="{1773BB8A-79EC-4F0D-8300-4EBE1242A0A2}" type="datetimeFigureOut">
               <a:rPr lang="en-US" smtClean="0"/>
-              <a:t>08/11/2016</a:t>
+              <a:t>09/11/2016</a:t>
             </a:fld>
             <a:endParaRPr lang="en-US"/>
           </a:p>
@@ -1462,7 +1357,7 @@
           <a:p>
             <a:fld id="{1773BB8A-79EC-4F0D-8300-4EBE1242A0A2}" type="datetimeFigureOut">
               <a:rPr lang="en-US" smtClean="0"/>
-              <a:t>08/11/2016</a:t>
+              <a:t>09/11/2016</a:t>
             </a:fld>
             <a:endParaRPr lang="en-US"/>
           </a:p>
@@ -1721,7 +1616,7 @@
           <a:p>
             <a:fld id="{1773BB8A-79EC-4F0D-8300-4EBE1242A0A2}" type="datetimeFigureOut">
               <a:rPr lang="en-US" smtClean="0"/>
-              <a:t>08/11/2016</a:t>
+              <a:t>09/11/2016</a:t>
             </a:fld>
             <a:endParaRPr lang="en-US"/>
           </a:p>
@@ -2190,7 +2085,7 @@
           <a:p>
             <a:fld id="{1773BB8A-79EC-4F0D-8300-4EBE1242A0A2}" type="datetimeFigureOut">
               <a:rPr lang="en-US" smtClean="0"/>
-              <a:t>08/11/2016</a:t>
+              <a:t>09/11/2016</a:t>
             </a:fld>
             <a:endParaRPr lang="en-US"/>
           </a:p>
@@ -2370,7 +2265,7 @@
           <a:p>
             <a:fld id="{1773BB8A-79EC-4F0D-8300-4EBE1242A0A2}" type="datetimeFigureOut">
               <a:rPr lang="en-US" smtClean="0"/>
-              <a:t>08/11/2016</a:t>
+              <a:t>09/11/2016</a:t>
             </a:fld>
             <a:endParaRPr lang="en-US"/>
           </a:p>
@@ -2946,7 +2841,7 @@
           <a:p>
             <a:fld id="{1773BB8A-79EC-4F0D-8300-4EBE1242A0A2}" type="datetimeFigureOut">
               <a:rPr lang="en-US" smtClean="0"/>
-              <a:t>08/11/2016</a:t>
+              <a:t>09/11/2016</a:t>
             </a:fld>
             <a:endParaRPr lang="en-US"/>
           </a:p>
@@ -3278,7 +3173,7 @@
           <a:p>
             <a:fld id="{1773BB8A-79EC-4F0D-8300-4EBE1242A0A2}" type="datetimeFigureOut">
               <a:rPr lang="en-US" smtClean="0"/>
-              <a:t>08/11/2016</a:t>
+              <a:t>09/11/2016</a:t>
             </a:fld>
             <a:endParaRPr lang="en-US"/>
           </a:p>
@@ -3453,7 +3348,7 @@
           <a:p>
             <a:fld id="{1773BB8A-79EC-4F0D-8300-4EBE1242A0A2}" type="datetimeFigureOut">
               <a:rPr lang="en-US" smtClean="0"/>
-              <a:t>08/11/2016</a:t>
+              <a:t>09/11/2016</a:t>
             </a:fld>
             <a:endParaRPr lang="en-US"/>
           </a:p>
@@ -3633,7 +3528,7 @@
           <a:p>
             <a:fld id="{1773BB8A-79EC-4F0D-8300-4EBE1242A0A2}" type="datetimeFigureOut">
               <a:rPr lang="en-US" smtClean="0"/>
-              <a:t>08/11/2016</a:t>
+              <a:t>09/11/2016</a:t>
             </a:fld>
             <a:endParaRPr lang="en-US"/>
           </a:p>
@@ -3803,7 +3698,7 @@
           <a:p>
             <a:fld id="{1773BB8A-79EC-4F0D-8300-4EBE1242A0A2}" type="datetimeFigureOut">
               <a:rPr lang="en-US" smtClean="0"/>
-              <a:t>08/11/2016</a:t>
+              <a:t>09/11/2016</a:t>
             </a:fld>
             <a:endParaRPr lang="en-US"/>
           </a:p>
@@ -4060,7 +3955,7 @@
           <a:p>
             <a:fld id="{1773BB8A-79EC-4F0D-8300-4EBE1242A0A2}" type="datetimeFigureOut">
               <a:rPr lang="en-US" smtClean="0"/>
-              <a:t>08/11/2016</a:t>
+              <a:t>09/11/2016</a:t>
             </a:fld>
             <a:endParaRPr lang="en-US"/>
           </a:p>
@@ -4352,7 +4247,7 @@
           <a:p>
             <a:fld id="{1773BB8A-79EC-4F0D-8300-4EBE1242A0A2}" type="datetimeFigureOut">
               <a:rPr lang="en-US" smtClean="0"/>
-              <a:t>08/11/2016</a:t>
+              <a:t>09/11/2016</a:t>
             </a:fld>
             <a:endParaRPr lang="en-US"/>
           </a:p>
@@ -4782,7 +4677,7 @@
           <a:p>
             <a:fld id="{1773BB8A-79EC-4F0D-8300-4EBE1242A0A2}" type="datetimeFigureOut">
               <a:rPr lang="en-US" smtClean="0"/>
-              <a:t>08/11/2016</a:t>
+              <a:t>09/11/2016</a:t>
             </a:fld>
             <a:endParaRPr lang="en-US"/>
           </a:p>
@@ -4900,7 +4795,7 @@
           <a:p>
             <a:fld id="{1773BB8A-79EC-4F0D-8300-4EBE1242A0A2}" type="datetimeFigureOut">
               <a:rPr lang="en-US" smtClean="0"/>
-              <a:t>08/11/2016</a:t>
+              <a:t>09/11/2016</a:t>
             </a:fld>
             <a:endParaRPr lang="en-US"/>
           </a:p>
@@ -4995,7 +4890,7 @@
           <a:p>
             <a:fld id="{1773BB8A-79EC-4F0D-8300-4EBE1242A0A2}" type="datetimeFigureOut">
               <a:rPr lang="en-US" smtClean="0"/>
-              <a:t>08/11/2016</a:t>
+              <a:t>09/11/2016</a:t>
             </a:fld>
             <a:endParaRPr lang="en-US"/>
           </a:p>
@@ -5278,7 +5173,7 @@
           <a:p>
             <a:fld id="{1773BB8A-79EC-4F0D-8300-4EBE1242A0A2}" type="datetimeFigureOut">
               <a:rPr lang="en-US" smtClean="0"/>
-              <a:t>08/11/2016</a:t>
+              <a:t>09/11/2016</a:t>
             </a:fld>
             <a:endParaRPr lang="en-US"/>
           </a:p>
@@ -5569,7 +5464,7 @@
           <a:p>
             <a:fld id="{1773BB8A-79EC-4F0D-8300-4EBE1242A0A2}" type="datetimeFigureOut">
               <a:rPr lang="en-US" smtClean="0"/>
-              <a:t>08/11/2016</a:t>
+              <a:t>09/11/2016</a:t>
             </a:fld>
             <a:endParaRPr lang="en-US"/>
           </a:p>
@@ -5800,7 +5695,7 @@
           <a:p>
             <a:fld id="{1773BB8A-79EC-4F0D-8300-4EBE1242A0A2}" type="datetimeFigureOut">
               <a:rPr lang="en-US" smtClean="0"/>
-              <a:t>08/11/2016</a:t>
+              <a:t>09/11/2016</a:t>
             </a:fld>
             <a:endParaRPr lang="en-US"/>
           </a:p>
@@ -6760,7 +6655,12 @@
             <p:ph idx="1"/>
           </p:nvPr>
         </p:nvSpPr>
-        <p:spPr/>
+        <p:spPr>
+          <a:xfrm>
+            <a:off x="1141413" y="2666999"/>
+            <a:ext cx="9905998" cy="3647091"/>
+          </a:xfrm>
+        </p:spPr>
         <p:txBody>
           <a:bodyPr>
             <a:normAutofit/>
@@ -6818,6 +6718,14 @@
                 <a:effectLst/>
               </a:rPr>
               <a:t>stack</a:t>
+            </a:r>
+          </a:p>
+          <a:p>
+            <a:r>
+              <a:rPr lang="en-US" sz="2400" dirty="0" smtClean="0">
+                <a:effectLst/>
+              </a:rPr>
+              <a:t>React Native for mobile apps.</a:t>
             </a:r>
             <a:endParaRPr lang="en-US" sz="2400" dirty="0">
               <a:effectLst/>
@@ -7322,13 +7230,7 @@
               <a:rPr lang="en-US" dirty="0" smtClean="0">
                 <a:effectLst/>
               </a:rPr>
-              <a:t>A </a:t>
-            </a:r>
-            <a:r>
-              <a:rPr lang="en-US" dirty="0" smtClean="0">
-                <a:effectLst/>
-              </a:rPr>
-              <a:t>component have methods</a:t>
+              <a:t>A component have methods</a:t>
             </a:r>
             <a:endParaRPr lang="en-US" dirty="0"/>
           </a:p>
@@ -7380,9 +7282,6 @@
               </a:rPr>
               <a:t>Unmounting            Lifecycle</a:t>
             </a:r>
-            <a:endParaRPr lang="en-US" sz="2200" dirty="0" smtClean="0">
-              <a:effectLst/>
-            </a:endParaRPr>
           </a:p>
           <a:p>
             <a:pPr lvl="1"/>
@@ -7560,13 +7459,7 @@
               <a:rPr lang="en-US" dirty="0" smtClean="0">
                 <a:effectLst/>
               </a:rPr>
-              <a:t>A </a:t>
-            </a:r>
-            <a:r>
-              <a:rPr lang="en-US" dirty="0" smtClean="0">
-                <a:effectLst/>
-              </a:rPr>
-              <a:t>component have props</a:t>
+              <a:t>A component have props</a:t>
             </a:r>
             <a:endParaRPr lang="en-US" dirty="0"/>
           </a:p>
@@ -7736,13 +7629,7 @@
               <a:rPr lang="en-US" dirty="0" smtClean="0">
                 <a:effectLst/>
               </a:rPr>
-              <a:t>A </a:t>
-            </a:r>
-            <a:r>
-              <a:rPr lang="en-US" dirty="0" smtClean="0">
-                <a:effectLst/>
-              </a:rPr>
-              <a:t>component have A State</a:t>
+              <a:t>A component have A State</a:t>
             </a:r>
             <a:endParaRPr lang="en-US" dirty="0"/>
           </a:p>
@@ -7890,7 +7777,9 @@
           <a:lstStyle/>
           <a:p>
             <a:r>
-              <a:rPr lang="en-US" dirty="0" smtClean="0"/>
+              <a:rPr lang="en-US" dirty="0" smtClean="0">
+                <a:effectLst/>
+              </a:rPr>
               <a:t>Code example</a:t>
             </a:r>
             <a:endParaRPr lang="en-US" dirty="0"/>
@@ -7904,26 +7793,85 @@
             <a:spLocks noGrp="1"/>
           </p:cNvSpPr>
           <p:nvPr>
-            <p:ph idx="1"/>
-          </p:nvPr>
-        </p:nvSpPr>
-        <p:spPr/>
+            <p:ph sz="half" idx="1"/>
+          </p:nvPr>
+        </p:nvSpPr>
+        <p:spPr>
+          <a:xfrm>
+            <a:off x="1141411" y="2666999"/>
+            <a:ext cx="5196865" cy="3960447"/>
+          </a:xfrm>
+        </p:spPr>
         <p:txBody>
           <a:bodyPr>
             <a:normAutofit/>
           </a:bodyPr>
           <a:lstStyle/>
           <a:p>
+            <a:r>
+              <a:rPr lang="en-US" sz="2400" dirty="0" smtClean="0">
+                <a:effectLst/>
+              </a:rPr>
+              <a:t>Recat: an app to load cat pictures using react and a third party API</a:t>
+            </a:r>
             <a:endParaRPr lang="en-US" sz="2400" dirty="0">
               <a:effectLst/>
             </a:endParaRPr>
           </a:p>
-        </p:txBody>
-      </p:sp>
+          <a:p>
+            <a:endParaRPr lang="en-US" sz="2400" dirty="0">
+              <a:effectLst/>
+            </a:endParaRPr>
+          </a:p>
+          <a:p>
+            <a:r>
+              <a:rPr lang="en-US" sz="2400" dirty="0">
+                <a:effectLst/>
+              </a:rPr>
+              <a:t>URL: https://</a:t>
+            </a:r>
+            <a:r>
+              <a:rPr lang="en-US" sz="2400" dirty="0" smtClean="0">
+                <a:effectLst/>
+              </a:rPr>
+              <a:t>github.com/grenoult/recat</a:t>
+            </a:r>
+            <a:endParaRPr lang="en-US" sz="2400" dirty="0" smtClean="0">
+              <a:effectLst/>
+            </a:endParaRPr>
+          </a:p>
+        </p:txBody>
+      </p:sp>
+      <p:pic>
+        <p:nvPicPr>
+          <p:cNvPr id="5" name="Content Placeholder 4"/>
+          <p:cNvPicPr>
+            <a:picLocks noGrp="1" noChangeAspect="1"/>
+          </p:cNvPicPr>
+          <p:nvPr>
+            <p:ph sz="half" idx="2"/>
+          </p:nvPr>
+        </p:nvPicPr>
+        <p:blipFill>
+          <a:blip r:embed="rId2"/>
+          <a:stretch>
+            <a:fillRect/>
+          </a:stretch>
+        </p:blipFill>
+        <p:spPr>
+          <a:xfrm>
+            <a:off x="6345721" y="2667000"/>
+            <a:ext cx="4526584" cy="3124200"/>
+          </a:xfrm>
+          <a:prstGeom prst="rect">
+            <a:avLst/>
+          </a:prstGeom>
+        </p:spPr>
+      </p:pic>
     </p:spTree>
     <p:extLst>
       <p:ext uri="{BB962C8B-B14F-4D97-AF65-F5344CB8AC3E}">
-        <p14:creationId xmlns:p14="http://schemas.microsoft.com/office/powerpoint/2010/main" val="2920423009"/>
+        <p14:creationId xmlns:p14="http://schemas.microsoft.com/office/powerpoint/2010/main" val="1557474221"/>
       </p:ext>
     </p:extLst>
   </p:cSld>

</xml_diff>